<commit_message>
add re-generated fold-2,3 onnx
</commit_message>
<xml_diff>
--- a/figures/fig.pptx
+++ b/figures/fig.pptx
@@ -8,6 +8,7 @@
     <p:sldId id="256" r:id="rId2"/>
     <p:sldId id="257" r:id="rId3"/>
     <p:sldId id="258" r:id="rId4"/>
+    <p:sldId id="259" r:id="rId5"/>
   </p:sldIdLst>
   <p:sldSz cx="12192000" cy="6858000"/>
   <p:notesSz cx="6858000" cy="9144000"/>
@@ -263,7 +264,7 @@
           <a:p>
             <a:fld id="{F2AAFE3D-A000-4E48-8FB2-BCF858431792}" type="datetimeFigureOut">
               <a:rPr lang="en-CN" smtClean="0"/>
-              <a:t>2023/8/15</a:t>
+              <a:t>2023/9/5</a:t>
             </a:fld>
             <a:endParaRPr lang="en-CN"/>
           </a:p>
@@ -463,7 +464,7 @@
           <a:p>
             <a:fld id="{F2AAFE3D-A000-4E48-8FB2-BCF858431792}" type="datetimeFigureOut">
               <a:rPr lang="en-CN" smtClean="0"/>
-              <a:t>2023/8/15</a:t>
+              <a:t>2023/9/5</a:t>
             </a:fld>
             <a:endParaRPr lang="en-CN"/>
           </a:p>
@@ -673,7 +674,7 @@
           <a:p>
             <a:fld id="{F2AAFE3D-A000-4E48-8FB2-BCF858431792}" type="datetimeFigureOut">
               <a:rPr lang="en-CN" smtClean="0"/>
-              <a:t>2023/8/15</a:t>
+              <a:t>2023/9/5</a:t>
             </a:fld>
             <a:endParaRPr lang="en-CN"/>
           </a:p>
@@ -873,7 +874,7 @@
           <a:p>
             <a:fld id="{F2AAFE3D-A000-4E48-8FB2-BCF858431792}" type="datetimeFigureOut">
               <a:rPr lang="en-CN" smtClean="0"/>
-              <a:t>2023/8/15</a:t>
+              <a:t>2023/9/5</a:t>
             </a:fld>
             <a:endParaRPr lang="en-CN"/>
           </a:p>
@@ -1149,7 +1150,7 @@
           <a:p>
             <a:fld id="{F2AAFE3D-A000-4E48-8FB2-BCF858431792}" type="datetimeFigureOut">
               <a:rPr lang="en-CN" smtClean="0"/>
-              <a:t>2023/8/15</a:t>
+              <a:t>2023/9/5</a:t>
             </a:fld>
             <a:endParaRPr lang="en-CN"/>
           </a:p>
@@ -1417,7 +1418,7 @@
           <a:p>
             <a:fld id="{F2AAFE3D-A000-4E48-8FB2-BCF858431792}" type="datetimeFigureOut">
               <a:rPr lang="en-CN" smtClean="0"/>
-              <a:t>2023/8/15</a:t>
+              <a:t>2023/9/5</a:t>
             </a:fld>
             <a:endParaRPr lang="en-CN"/>
           </a:p>
@@ -1832,7 +1833,7 @@
           <a:p>
             <a:fld id="{F2AAFE3D-A000-4E48-8FB2-BCF858431792}" type="datetimeFigureOut">
               <a:rPr lang="en-CN" smtClean="0"/>
-              <a:t>2023/8/15</a:t>
+              <a:t>2023/9/5</a:t>
             </a:fld>
             <a:endParaRPr lang="en-CN"/>
           </a:p>
@@ -1974,7 +1975,7 @@
           <a:p>
             <a:fld id="{F2AAFE3D-A000-4E48-8FB2-BCF858431792}" type="datetimeFigureOut">
               <a:rPr lang="en-CN" smtClean="0"/>
-              <a:t>2023/8/15</a:t>
+              <a:t>2023/9/5</a:t>
             </a:fld>
             <a:endParaRPr lang="en-CN"/>
           </a:p>
@@ -2087,7 +2088,7 @@
           <a:p>
             <a:fld id="{F2AAFE3D-A000-4E48-8FB2-BCF858431792}" type="datetimeFigureOut">
               <a:rPr lang="en-CN" smtClean="0"/>
-              <a:t>2023/8/15</a:t>
+              <a:t>2023/9/5</a:t>
             </a:fld>
             <a:endParaRPr lang="en-CN"/>
           </a:p>
@@ -2400,7 +2401,7 @@
           <a:p>
             <a:fld id="{F2AAFE3D-A000-4E48-8FB2-BCF858431792}" type="datetimeFigureOut">
               <a:rPr lang="en-CN" smtClean="0"/>
-              <a:t>2023/8/15</a:t>
+              <a:t>2023/9/5</a:t>
             </a:fld>
             <a:endParaRPr lang="en-CN"/>
           </a:p>
@@ -2689,7 +2690,7 @@
           <a:p>
             <a:fld id="{F2AAFE3D-A000-4E48-8FB2-BCF858431792}" type="datetimeFigureOut">
               <a:rPr lang="en-CN" smtClean="0"/>
-              <a:t>2023/8/15</a:t>
+              <a:t>2023/9/5</a:t>
             </a:fld>
             <a:endParaRPr lang="en-CN"/>
           </a:p>
@@ -2932,7 +2933,7 @@
           <a:p>
             <a:fld id="{F2AAFE3D-A000-4E48-8FB2-BCF858431792}" type="datetimeFigureOut">
               <a:rPr lang="en-CN" smtClean="0"/>
-              <a:t>2023/8/15</a:t>
+              <a:t>2023/9/5</a:t>
             </a:fld>
             <a:endParaRPr lang="en-CN"/>
           </a:p>
@@ -9031,6 +9032,1586 @@
 </p:sld>
 </file>
 
+<file path=ppt/slides/slide4.xml><?xml version="1.0" encoding="utf-8"?>
+<p:sld xmlns:a="http://schemas.openxmlformats.org/drawingml/2006/main" xmlns:r="http://schemas.openxmlformats.org/officeDocument/2006/relationships" xmlns:p="http://schemas.openxmlformats.org/presentationml/2006/main">
+  <p:cSld>
+    <p:spTree>
+      <p:nvGrpSpPr>
+        <p:cNvPr id="1" name=""/>
+        <p:cNvGrpSpPr/>
+        <p:nvPr/>
+      </p:nvGrpSpPr>
+      <p:grpSpPr>
+        <a:xfrm>
+          <a:off x="0" y="0"/>
+          <a:ext cx="0" cy="0"/>
+          <a:chOff x="0" y="0"/>
+          <a:chExt cx="0" cy="0"/>
+        </a:xfrm>
+      </p:grpSpPr>
+      <p:pic>
+        <p:nvPicPr>
+          <p:cNvPr id="5" name="Picture 4">
+            <a:extLst>
+              <a:ext uri="{FF2B5EF4-FFF2-40B4-BE49-F238E27FC236}">
+                <a16:creationId xmlns:a16="http://schemas.microsoft.com/office/drawing/2014/main" id="{456FB37A-2827-1189-33F8-AC7502923D70}"/>
+              </a:ext>
+            </a:extLst>
+          </p:cNvPr>
+          <p:cNvPicPr>
+            <a:picLocks noChangeAspect="1"/>
+          </p:cNvPicPr>
+          <p:nvPr/>
+        </p:nvPicPr>
+        <p:blipFill>
+          <a:blip r:embed="rId2"/>
+          <a:stretch>
+            <a:fillRect/>
+          </a:stretch>
+        </p:blipFill>
+        <p:spPr>
+          <a:xfrm>
+            <a:off x="0" y="5898403"/>
+            <a:ext cx="6553200" cy="4546600"/>
+          </a:xfrm>
+          <a:prstGeom prst="rect">
+            <a:avLst/>
+          </a:prstGeom>
+        </p:spPr>
+      </p:pic>
+      <p:pic>
+        <p:nvPicPr>
+          <p:cNvPr id="7" name="Picture 6">
+            <a:extLst>
+              <a:ext uri="{FF2B5EF4-FFF2-40B4-BE49-F238E27FC236}">
+                <a16:creationId xmlns:a16="http://schemas.microsoft.com/office/drawing/2014/main" id="{AD01F030-D646-02E9-79B6-FBC114A0DAD5}"/>
+              </a:ext>
+            </a:extLst>
+          </p:cNvPr>
+          <p:cNvPicPr>
+            <a:picLocks noChangeAspect="1"/>
+          </p:cNvPicPr>
+          <p:nvPr/>
+        </p:nvPicPr>
+        <p:blipFill>
+          <a:blip r:embed="rId3"/>
+          <a:stretch>
+            <a:fillRect/>
+          </a:stretch>
+        </p:blipFill>
+        <p:spPr>
+          <a:xfrm>
+            <a:off x="-5912597" y="2774203"/>
+            <a:ext cx="5549900" cy="5397500"/>
+          </a:xfrm>
+          <a:prstGeom prst="rect">
+            <a:avLst/>
+          </a:prstGeom>
+        </p:spPr>
+      </p:pic>
+      <p:pic>
+        <p:nvPicPr>
+          <p:cNvPr id="9" name="Picture 8">
+            <a:extLst>
+              <a:ext uri="{FF2B5EF4-FFF2-40B4-BE49-F238E27FC236}">
+                <a16:creationId xmlns:a16="http://schemas.microsoft.com/office/drawing/2014/main" id="{30547C5E-05F0-449A-47FE-C9125C6D7B10}"/>
+              </a:ext>
+            </a:extLst>
+          </p:cNvPr>
+          <p:cNvPicPr>
+            <a:picLocks noChangeAspect="1"/>
+          </p:cNvPicPr>
+          <p:nvPr/>
+        </p:nvPicPr>
+        <p:blipFill>
+          <a:blip r:embed="rId4"/>
+          <a:stretch>
+            <a:fillRect/>
+          </a:stretch>
+        </p:blipFill>
+        <p:spPr>
+          <a:xfrm>
+            <a:off x="-5102225" y="-1275977"/>
+            <a:ext cx="5448300" cy="3098800"/>
+          </a:xfrm>
+          <a:prstGeom prst="rect">
+            <a:avLst/>
+          </a:prstGeom>
+        </p:spPr>
+      </p:pic>
+      <p:sp>
+        <p:nvSpPr>
+          <p:cNvPr id="10" name="Rectangle 9">
+            <a:extLst>
+              <a:ext uri="{FF2B5EF4-FFF2-40B4-BE49-F238E27FC236}">
+                <a16:creationId xmlns:a16="http://schemas.microsoft.com/office/drawing/2014/main" id="{473D68D9-3B6D-6A68-36FA-6702D2F2CBF8}"/>
+              </a:ext>
+            </a:extLst>
+          </p:cNvPr>
+          <p:cNvSpPr/>
+          <p:nvPr/>
+        </p:nvSpPr>
+        <p:spPr>
+          <a:xfrm>
+            <a:off x="829491" y="3754479"/>
+            <a:ext cx="5928412" cy="952923"/>
+          </a:xfrm>
+          <a:prstGeom prst="rect">
+            <a:avLst/>
+          </a:prstGeom>
+          <a:noFill/>
+          <a:ln w="15875" cap="flat" cmpd="sng" algn="ctr">
+            <a:solidFill>
+              <a:schemeClr val="dk1"/>
+            </a:solidFill>
+            <a:prstDash val="dash"/>
+            <a:round/>
+            <a:headEnd type="none" w="med" len="med"/>
+            <a:tailEnd type="none" w="med" len="med"/>
+          </a:ln>
+        </p:spPr>
+        <p:style>
+          <a:lnRef idx="0">
+            <a:scrgbClr r="0" g="0" b="0"/>
+          </a:lnRef>
+          <a:fillRef idx="0">
+            <a:scrgbClr r="0" g="0" b="0"/>
+          </a:fillRef>
+          <a:effectRef idx="0">
+            <a:scrgbClr r="0" g="0" b="0"/>
+          </a:effectRef>
+          <a:fontRef idx="minor">
+            <a:schemeClr val="dk1"/>
+          </a:fontRef>
+        </p:style>
+        <p:txBody>
+          <a:bodyPr rtlCol="0" anchor="ctr"/>
+          <a:lstStyle/>
+          <a:p>
+            <a:pPr algn="ctr"/>
+            <a:endParaRPr lang="en-CN" sz="1200"/>
+          </a:p>
+        </p:txBody>
+      </p:sp>
+      <p:sp>
+        <p:nvSpPr>
+          <p:cNvPr id="11" name="Rectangle 10">
+            <a:extLst>
+              <a:ext uri="{FF2B5EF4-FFF2-40B4-BE49-F238E27FC236}">
+                <a16:creationId xmlns:a16="http://schemas.microsoft.com/office/drawing/2014/main" id="{A92492DC-0FCA-47AC-5447-8174225DF9D9}"/>
+              </a:ext>
+            </a:extLst>
+          </p:cNvPr>
+          <p:cNvSpPr/>
+          <p:nvPr/>
+        </p:nvSpPr>
+        <p:spPr>
+          <a:xfrm>
+            <a:off x="7550912" y="2906182"/>
+            <a:ext cx="1505014" cy="428449"/>
+          </a:xfrm>
+          <a:prstGeom prst="rect">
+            <a:avLst/>
+          </a:prstGeom>
+          <a:solidFill>
+            <a:schemeClr val="dk1">
+              <a:alpha val="50000"/>
+            </a:schemeClr>
+          </a:solidFill>
+          <a:ln>
+            <a:noFill/>
+          </a:ln>
+        </p:spPr>
+        <p:style>
+          <a:lnRef idx="0">
+            <a:scrgbClr r="0" g="0" b="0"/>
+          </a:lnRef>
+          <a:fillRef idx="0">
+            <a:scrgbClr r="0" g="0" b="0"/>
+          </a:fillRef>
+          <a:effectRef idx="0">
+            <a:scrgbClr r="0" g="0" b="0"/>
+          </a:effectRef>
+          <a:fontRef idx="minor">
+            <a:schemeClr val="lt1"/>
+          </a:fontRef>
+        </p:style>
+        <p:txBody>
+          <a:bodyPr rtlCol="0" anchor="ctr"/>
+          <a:lstStyle/>
+          <a:p>
+            <a:pPr algn="ctr"/>
+            <a:r>
+              <a:rPr lang="en-US" sz="1200" dirty="0"/>
+              <a:t>B</a:t>
+            </a:r>
+            <a:r>
+              <a:rPr lang="en-CN" sz="1200" dirty="0"/>
+              <a:t>ackbone</a:t>
+            </a:r>
+          </a:p>
+          <a:p>
+            <a:pPr algn="ctr"/>
+            <a:r>
+              <a:rPr lang="en-US" sz="1200" dirty="0"/>
+              <a:t>W</a:t>
+            </a:r>
+            <a:r>
+              <a:rPr lang="en-CN" sz="1200" dirty="0"/>
+              <a:t>eights</a:t>
+            </a:r>
+          </a:p>
+        </p:txBody>
+      </p:sp>
+      <p:sp>
+        <p:nvSpPr>
+          <p:cNvPr id="12" name="Rectangle 11">
+            <a:extLst>
+              <a:ext uri="{FF2B5EF4-FFF2-40B4-BE49-F238E27FC236}">
+                <a16:creationId xmlns:a16="http://schemas.microsoft.com/office/drawing/2014/main" id="{11D160D9-5C4F-E204-BD07-4910624AA4DB}"/>
+              </a:ext>
+            </a:extLst>
+          </p:cNvPr>
+          <p:cNvSpPr/>
+          <p:nvPr/>
+        </p:nvSpPr>
+        <p:spPr>
+          <a:xfrm>
+            <a:off x="7584229" y="3523370"/>
+            <a:ext cx="1505015" cy="442129"/>
+          </a:xfrm>
+          <a:prstGeom prst="rect">
+            <a:avLst/>
+          </a:prstGeom>
+          <a:solidFill>
+            <a:schemeClr val="dk1">
+              <a:alpha val="50000"/>
+            </a:schemeClr>
+          </a:solidFill>
+          <a:ln>
+            <a:noFill/>
+          </a:ln>
+        </p:spPr>
+        <p:style>
+          <a:lnRef idx="0">
+            <a:scrgbClr r="0" g="0" b="0"/>
+          </a:lnRef>
+          <a:fillRef idx="0">
+            <a:scrgbClr r="0" g="0" b="0"/>
+          </a:fillRef>
+          <a:effectRef idx="0">
+            <a:scrgbClr r="0" g="0" b="0"/>
+          </a:effectRef>
+          <a:fontRef idx="minor">
+            <a:schemeClr val="lt1"/>
+          </a:fontRef>
+        </p:style>
+        <p:txBody>
+          <a:bodyPr rtlCol="0" anchor="ctr"/>
+          <a:lstStyle/>
+          <a:p>
+            <a:pPr algn="ctr"/>
+            <a:r>
+              <a:rPr lang="en-US" sz="1200" dirty="0"/>
+              <a:t>Classifier</a:t>
+            </a:r>
+            <a:r>
+              <a:rPr lang="en-CN" sz="1200" dirty="0"/>
+              <a:t> </a:t>
+            </a:r>
+            <a:r>
+              <a:rPr lang="en-US" sz="1200" dirty="0"/>
+              <a:t>w</a:t>
+            </a:r>
+            <a:r>
+              <a:rPr lang="en-CN" sz="1200" dirty="0"/>
+              <a:t>eights</a:t>
+            </a:r>
+          </a:p>
+        </p:txBody>
+      </p:sp>
+      <p:sp>
+        <p:nvSpPr>
+          <p:cNvPr id="13" name="Multidocument 12">
+            <a:extLst>
+              <a:ext uri="{FF2B5EF4-FFF2-40B4-BE49-F238E27FC236}">
+                <a16:creationId xmlns:a16="http://schemas.microsoft.com/office/drawing/2014/main" id="{EC8EF0B1-38A4-B63F-864E-B8CA9468657D}"/>
+              </a:ext>
+            </a:extLst>
+          </p:cNvPr>
+          <p:cNvSpPr/>
+          <p:nvPr/>
+        </p:nvSpPr>
+        <p:spPr>
+          <a:xfrm>
+            <a:off x="891982" y="3927793"/>
+            <a:ext cx="1028985" cy="695311"/>
+          </a:xfrm>
+          <a:prstGeom prst="flowChartMultidocument">
+            <a:avLst/>
+          </a:prstGeom>
+          <a:solidFill>
+            <a:schemeClr val="dk1">
+              <a:alpha val="50000"/>
+            </a:schemeClr>
+          </a:solidFill>
+          <a:ln>
+            <a:solidFill>
+              <a:schemeClr val="tx1"/>
+            </a:solidFill>
+          </a:ln>
+        </p:spPr>
+        <p:style>
+          <a:lnRef idx="0">
+            <a:scrgbClr r="0" g="0" b="0"/>
+          </a:lnRef>
+          <a:fillRef idx="0">
+            <a:scrgbClr r="0" g="0" b="0"/>
+          </a:fillRef>
+          <a:effectRef idx="0">
+            <a:scrgbClr r="0" g="0" b="0"/>
+          </a:effectRef>
+          <a:fontRef idx="minor">
+            <a:schemeClr val="lt1"/>
+          </a:fontRef>
+        </p:style>
+        <p:txBody>
+          <a:bodyPr rtlCol="0" anchor="ctr"/>
+          <a:lstStyle/>
+          <a:p>
+            <a:pPr algn="ctr"/>
+            <a:r>
+              <a:rPr lang="en-CN" sz="1200" dirty="0"/>
+              <a:t>Backbone Weights</a:t>
+            </a:r>
+          </a:p>
+        </p:txBody>
+      </p:sp>
+      <p:sp>
+        <p:nvSpPr>
+          <p:cNvPr id="14" name="Multidocument 13">
+            <a:extLst>
+              <a:ext uri="{FF2B5EF4-FFF2-40B4-BE49-F238E27FC236}">
+                <a16:creationId xmlns:a16="http://schemas.microsoft.com/office/drawing/2014/main" id="{E24F532D-0613-3A5C-72BE-C090F7FEDE2B}"/>
+              </a:ext>
+            </a:extLst>
+          </p:cNvPr>
+          <p:cNvSpPr/>
+          <p:nvPr/>
+        </p:nvSpPr>
+        <p:spPr>
+          <a:xfrm>
+            <a:off x="2034844" y="3927793"/>
+            <a:ext cx="1028985" cy="695311"/>
+          </a:xfrm>
+          <a:prstGeom prst="flowChartMultidocument">
+            <a:avLst/>
+          </a:prstGeom>
+          <a:solidFill>
+            <a:schemeClr val="dk1">
+              <a:alpha val="50000"/>
+            </a:schemeClr>
+          </a:solidFill>
+          <a:ln>
+            <a:solidFill>
+              <a:schemeClr val="tx1"/>
+            </a:solidFill>
+          </a:ln>
+        </p:spPr>
+        <p:style>
+          <a:lnRef idx="0">
+            <a:scrgbClr r="0" g="0" b="0"/>
+          </a:lnRef>
+          <a:fillRef idx="0">
+            <a:scrgbClr r="0" g="0" b="0"/>
+          </a:fillRef>
+          <a:effectRef idx="0">
+            <a:scrgbClr r="0" g="0" b="0"/>
+          </a:effectRef>
+          <a:fontRef idx="minor">
+            <a:schemeClr val="lt1"/>
+          </a:fontRef>
+        </p:style>
+        <p:txBody>
+          <a:bodyPr rtlCol="0" anchor="ctr"/>
+          <a:lstStyle/>
+          <a:p>
+            <a:pPr algn="ctr"/>
+            <a:r>
+              <a:rPr lang="en-CN" sz="1200" dirty="0"/>
+              <a:t>Classifier Weights</a:t>
+            </a:r>
+          </a:p>
+        </p:txBody>
+      </p:sp>
+      <p:sp>
+        <p:nvSpPr>
+          <p:cNvPr id="15" name="Rectangle 14">
+            <a:extLst>
+              <a:ext uri="{FF2B5EF4-FFF2-40B4-BE49-F238E27FC236}">
+                <a16:creationId xmlns:a16="http://schemas.microsoft.com/office/drawing/2014/main" id="{F94EC49F-132E-85BE-D7B3-CF4595167B93}"/>
+              </a:ext>
+            </a:extLst>
+          </p:cNvPr>
+          <p:cNvSpPr/>
+          <p:nvPr/>
+        </p:nvSpPr>
+        <p:spPr>
+          <a:xfrm>
+            <a:off x="829491" y="2449794"/>
+            <a:ext cx="5928412" cy="952923"/>
+          </a:xfrm>
+          <a:prstGeom prst="rect">
+            <a:avLst/>
+          </a:prstGeom>
+          <a:noFill/>
+          <a:ln w="15875" cap="flat" cmpd="sng" algn="ctr">
+            <a:solidFill>
+              <a:schemeClr val="dk1"/>
+            </a:solidFill>
+            <a:prstDash val="dash"/>
+            <a:round/>
+            <a:headEnd type="none" w="med" len="med"/>
+            <a:tailEnd type="none" w="med" len="med"/>
+          </a:ln>
+        </p:spPr>
+        <p:style>
+          <a:lnRef idx="0">
+            <a:scrgbClr r="0" g="0" b="0"/>
+          </a:lnRef>
+          <a:fillRef idx="0">
+            <a:scrgbClr r="0" g="0" b="0"/>
+          </a:fillRef>
+          <a:effectRef idx="0">
+            <a:scrgbClr r="0" g="0" b="0"/>
+          </a:effectRef>
+          <a:fontRef idx="minor">
+            <a:schemeClr val="dk1"/>
+          </a:fontRef>
+        </p:style>
+        <p:txBody>
+          <a:bodyPr rtlCol="0" anchor="ctr"/>
+          <a:lstStyle/>
+          <a:p>
+            <a:pPr algn="ctr"/>
+            <a:endParaRPr lang="en-CN" sz="1200"/>
+          </a:p>
+        </p:txBody>
+      </p:sp>
+      <p:sp>
+        <p:nvSpPr>
+          <p:cNvPr id="17" name="Rectangle 16">
+            <a:extLst>
+              <a:ext uri="{FF2B5EF4-FFF2-40B4-BE49-F238E27FC236}">
+                <a16:creationId xmlns:a16="http://schemas.microsoft.com/office/drawing/2014/main" id="{BBF24285-7B21-3A82-79E3-D72099FA2BDE}"/>
+              </a:ext>
+            </a:extLst>
+          </p:cNvPr>
+          <p:cNvSpPr/>
+          <p:nvPr/>
+        </p:nvSpPr>
+        <p:spPr>
+          <a:xfrm>
+            <a:off x="4452478" y="4315835"/>
+            <a:ext cx="1028986" cy="307270"/>
+          </a:xfrm>
+          <a:prstGeom prst="rect">
+            <a:avLst/>
+          </a:prstGeom>
+        </p:spPr>
+        <p:style>
+          <a:lnRef idx="2">
+            <a:schemeClr val="accent1">
+              <a:shade val="15000"/>
+            </a:schemeClr>
+          </a:lnRef>
+          <a:fillRef idx="1">
+            <a:schemeClr val="accent1"/>
+          </a:fillRef>
+          <a:effectRef idx="0">
+            <a:schemeClr val="accent1"/>
+          </a:effectRef>
+          <a:fontRef idx="minor">
+            <a:schemeClr val="lt1"/>
+          </a:fontRef>
+        </p:style>
+        <p:txBody>
+          <a:bodyPr rtlCol="0" anchor="ctr"/>
+          <a:lstStyle/>
+          <a:p>
+            <a:pPr algn="ctr"/>
+            <a:r>
+              <a:rPr lang="en-US" sz="1200" dirty="0"/>
+              <a:t>i</a:t>
+            </a:r>
+            <a:r>
+              <a:rPr lang="en-CN" sz="1200" dirty="0"/>
+              <a:t>nput</a:t>
+            </a:r>
+          </a:p>
+        </p:txBody>
+      </p:sp>
+      <p:sp>
+        <p:nvSpPr>
+          <p:cNvPr id="18" name="Rectangle 17">
+            <a:extLst>
+              <a:ext uri="{FF2B5EF4-FFF2-40B4-BE49-F238E27FC236}">
+                <a16:creationId xmlns:a16="http://schemas.microsoft.com/office/drawing/2014/main" id="{C0E8537F-1A11-D16A-6A34-FE51BB700406}"/>
+              </a:ext>
+            </a:extLst>
+          </p:cNvPr>
+          <p:cNvSpPr/>
+          <p:nvPr/>
+        </p:nvSpPr>
+        <p:spPr>
+          <a:xfrm>
+            <a:off x="4452483" y="3927793"/>
+            <a:ext cx="1028985" cy="303742"/>
+          </a:xfrm>
+          <a:prstGeom prst="rect">
+            <a:avLst/>
+          </a:prstGeom>
+        </p:spPr>
+        <p:style>
+          <a:lnRef idx="2">
+            <a:schemeClr val="accent1">
+              <a:shade val="15000"/>
+            </a:schemeClr>
+          </a:lnRef>
+          <a:fillRef idx="1">
+            <a:schemeClr val="accent1"/>
+          </a:fillRef>
+          <a:effectRef idx="0">
+            <a:schemeClr val="accent1"/>
+          </a:effectRef>
+          <a:fontRef idx="minor">
+            <a:schemeClr val="lt1"/>
+          </a:fontRef>
+        </p:style>
+        <p:txBody>
+          <a:bodyPr rtlCol="0" anchor="ctr"/>
+          <a:lstStyle/>
+          <a:p>
+            <a:pPr algn="ctr"/>
+            <a:r>
+              <a:rPr lang="en-US" sz="1200" dirty="0"/>
+              <a:t>output</a:t>
+            </a:r>
+            <a:endParaRPr lang="en-CN" sz="1200" dirty="0"/>
+          </a:p>
+        </p:txBody>
+      </p:sp>
+      <p:sp>
+        <p:nvSpPr>
+          <p:cNvPr id="19" name="Rectangle 18">
+            <a:extLst>
+              <a:ext uri="{FF2B5EF4-FFF2-40B4-BE49-F238E27FC236}">
+                <a16:creationId xmlns:a16="http://schemas.microsoft.com/office/drawing/2014/main" id="{AF94EC9C-1AEC-ACE4-076A-F4FDE19F1FA1}"/>
+              </a:ext>
+            </a:extLst>
+          </p:cNvPr>
+          <p:cNvSpPr/>
+          <p:nvPr/>
+        </p:nvSpPr>
+        <p:spPr>
+          <a:xfrm>
+            <a:off x="5611511" y="3927795"/>
+            <a:ext cx="1079989" cy="695309"/>
+          </a:xfrm>
+          <a:prstGeom prst="rect">
+            <a:avLst/>
+          </a:prstGeom>
+        </p:spPr>
+        <p:style>
+          <a:lnRef idx="2">
+            <a:schemeClr val="accent6">
+              <a:shade val="15000"/>
+            </a:schemeClr>
+          </a:lnRef>
+          <a:fillRef idx="1">
+            <a:schemeClr val="accent6"/>
+          </a:fillRef>
+          <a:effectRef idx="0">
+            <a:schemeClr val="accent6"/>
+          </a:effectRef>
+          <a:fontRef idx="minor">
+            <a:schemeClr val="lt1"/>
+          </a:fontRef>
+        </p:style>
+        <p:txBody>
+          <a:bodyPr rtlCol="0" anchor="ctr"/>
+          <a:lstStyle/>
+          <a:p>
+            <a:pPr algn="ctr"/>
+            <a:r>
+              <a:rPr lang="en-US" sz="1200" dirty="0"/>
+              <a:t>w/b icmt</a:t>
+            </a:r>
+            <a:endParaRPr lang="en-CN" sz="1200" dirty="0"/>
+          </a:p>
+        </p:txBody>
+      </p:sp>
+      <p:grpSp>
+        <p:nvGrpSpPr>
+          <p:cNvPr id="38" name="Group 37">
+            <a:extLst>
+              <a:ext uri="{FF2B5EF4-FFF2-40B4-BE49-F238E27FC236}">
+                <a16:creationId xmlns:a16="http://schemas.microsoft.com/office/drawing/2014/main" id="{511C73D8-3D63-8C76-F103-B24817A66D15}"/>
+              </a:ext>
+            </a:extLst>
+          </p:cNvPr>
+          <p:cNvGrpSpPr/>
+          <p:nvPr/>
+        </p:nvGrpSpPr>
+        <p:grpSpPr>
+          <a:xfrm>
+            <a:off x="3177706" y="3887356"/>
+            <a:ext cx="1274772" cy="729320"/>
+            <a:chOff x="3220913" y="3791404"/>
+            <a:chExt cx="1274772" cy="729320"/>
+          </a:xfrm>
+        </p:grpSpPr>
+        <p:sp>
+          <p:nvSpPr>
+            <p:cNvPr id="29" name="Rounded Rectangle 28">
+              <a:extLst>
+                <a:ext uri="{FF2B5EF4-FFF2-40B4-BE49-F238E27FC236}">
+                  <a16:creationId xmlns:a16="http://schemas.microsoft.com/office/drawing/2014/main" id="{41BF1648-945D-A669-2B8C-F008551E131B}"/>
+                </a:ext>
+              </a:extLst>
+            </p:cNvPr>
+            <p:cNvSpPr/>
+            <p:nvPr/>
+          </p:nvSpPr>
+          <p:spPr>
+            <a:xfrm>
+              <a:off x="3243659" y="3825414"/>
+              <a:ext cx="1121978" cy="695310"/>
+            </a:xfrm>
+            <a:prstGeom prst="roundRect">
+              <a:avLst/>
+            </a:prstGeom>
+            <a:solidFill>
+              <a:srgbClr val="7030A0">
+                <a:alpha val="50000"/>
+              </a:srgbClr>
+            </a:solidFill>
+            <a:ln>
+              <a:solidFill>
+                <a:schemeClr val="tx1"/>
+              </a:solidFill>
+            </a:ln>
+          </p:spPr>
+          <p:style>
+            <a:lnRef idx="0">
+              <a:scrgbClr r="0" g="0" b="0"/>
+            </a:lnRef>
+            <a:fillRef idx="0">
+              <a:scrgbClr r="0" g="0" b="0"/>
+            </a:fillRef>
+            <a:effectRef idx="0">
+              <a:scrgbClr r="0" g="0" b="0"/>
+            </a:effectRef>
+            <a:fontRef idx="minor">
+              <a:schemeClr val="lt1"/>
+            </a:fontRef>
+          </p:style>
+          <p:txBody>
+            <a:bodyPr rtlCol="0" anchor="ctr"/>
+            <a:lstStyle/>
+            <a:p>
+              <a:pPr algn="ctr"/>
+              <a:endParaRPr lang="en-CN" sz="1200" dirty="0"/>
+            </a:p>
+          </p:txBody>
+        </p:sp>
+        <p:sp>
+          <p:nvSpPr>
+            <p:cNvPr id="20" name="Rectangle 19">
+              <a:extLst>
+                <a:ext uri="{FF2B5EF4-FFF2-40B4-BE49-F238E27FC236}">
+                  <a16:creationId xmlns:a16="http://schemas.microsoft.com/office/drawing/2014/main" id="{1052ED9D-0E5E-E60F-2214-FD42A04FACB5}"/>
+                </a:ext>
+              </a:extLst>
+            </p:cNvPr>
+            <p:cNvSpPr/>
+            <p:nvPr/>
+          </p:nvSpPr>
+          <p:spPr>
+            <a:xfrm>
+              <a:off x="3313039" y="4077507"/>
+              <a:ext cx="983217" cy="307147"/>
+            </a:xfrm>
+            <a:prstGeom prst="rect">
+              <a:avLst/>
+            </a:prstGeom>
+          </p:spPr>
+          <p:style>
+            <a:lnRef idx="2">
+              <a:schemeClr val="accent6">
+                <a:shade val="15000"/>
+              </a:schemeClr>
+            </a:lnRef>
+            <a:fillRef idx="1">
+              <a:schemeClr val="accent6"/>
+            </a:fillRef>
+            <a:effectRef idx="0">
+              <a:schemeClr val="accent6"/>
+            </a:effectRef>
+            <a:fontRef idx="minor">
+              <a:schemeClr val="lt1"/>
+            </a:fontRef>
+          </p:style>
+          <p:txBody>
+            <a:bodyPr rtlCol="0" anchor="ctr"/>
+            <a:lstStyle/>
+            <a:p>
+              <a:pPr algn="ctr"/>
+              <a:r>
+                <a:rPr lang="en-US" sz="1200" dirty="0"/>
+                <a:t>dense input</a:t>
+              </a:r>
+              <a:endParaRPr lang="en-CN" sz="1200" dirty="0"/>
+            </a:p>
+          </p:txBody>
+        </p:sp>
+        <p:sp>
+          <p:nvSpPr>
+            <p:cNvPr id="37" name="TextBox 36">
+              <a:extLst>
+                <a:ext uri="{FF2B5EF4-FFF2-40B4-BE49-F238E27FC236}">
+                  <a16:creationId xmlns:a16="http://schemas.microsoft.com/office/drawing/2014/main" id="{45C0EACB-AF81-C7C3-0327-10F7D08DEA29}"/>
+                </a:ext>
+              </a:extLst>
+            </p:cNvPr>
+            <p:cNvSpPr txBox="1"/>
+            <p:nvPr/>
+          </p:nvSpPr>
+          <p:spPr>
+            <a:xfrm>
+              <a:off x="3220913" y="3791404"/>
+              <a:ext cx="1274772" cy="276999"/>
+            </a:xfrm>
+            <a:prstGeom prst="rect">
+              <a:avLst/>
+            </a:prstGeom>
+            <a:noFill/>
+          </p:spPr>
+          <p:txBody>
+            <a:bodyPr wrap="square">
+              <a:spAutoFit/>
+            </a:bodyPr>
+            <a:lstStyle/>
+            <a:p>
+              <a:r>
+                <a:rPr lang="en-CN" sz="1200" dirty="0">
+                  <a:solidFill>
+                    <a:schemeClr val="bg1"/>
+                  </a:solidFill>
+                </a:rPr>
+                <a:t>activations</a:t>
+              </a:r>
+              <a:endParaRPr lang="en-CN" sz="1100" dirty="0">
+                <a:solidFill>
+                  <a:schemeClr val="bg1"/>
+                </a:solidFill>
+              </a:endParaRPr>
+            </a:p>
+          </p:txBody>
+        </p:sp>
+      </p:grpSp>
+      <p:sp>
+        <p:nvSpPr>
+          <p:cNvPr id="39" name="Rounded Rectangle 38">
+            <a:extLst>
+              <a:ext uri="{FF2B5EF4-FFF2-40B4-BE49-F238E27FC236}">
+                <a16:creationId xmlns:a16="http://schemas.microsoft.com/office/drawing/2014/main" id="{91E8E9A4-24FE-58F7-2118-4DF1BF4192F5}"/>
+              </a:ext>
+            </a:extLst>
+          </p:cNvPr>
+          <p:cNvSpPr/>
+          <p:nvPr/>
+        </p:nvSpPr>
+        <p:spPr>
+          <a:xfrm>
+            <a:off x="891982" y="2629908"/>
+            <a:ext cx="4589482" cy="680157"/>
+          </a:xfrm>
+          <a:prstGeom prst="roundRect">
+            <a:avLst/>
+          </a:prstGeom>
+          <a:solidFill>
+            <a:schemeClr val="accent4">
+              <a:lumMod val="60000"/>
+              <a:lumOff val="40000"/>
+            </a:schemeClr>
+          </a:solidFill>
+        </p:spPr>
+        <p:style>
+          <a:lnRef idx="2">
+            <a:schemeClr val="accent1">
+              <a:shade val="15000"/>
+            </a:schemeClr>
+          </a:lnRef>
+          <a:fillRef idx="1">
+            <a:schemeClr val="accent1"/>
+          </a:fillRef>
+          <a:effectRef idx="0">
+            <a:schemeClr val="accent1"/>
+          </a:effectRef>
+          <a:fontRef idx="minor">
+            <a:schemeClr val="lt1"/>
+          </a:fontRef>
+        </p:style>
+        <p:txBody>
+          <a:bodyPr rtlCol="0" anchor="ctr"/>
+          <a:lstStyle/>
+          <a:p>
+            <a:pPr algn="ctr"/>
+            <a:r>
+              <a:rPr lang="en-US" sz="1200" dirty="0"/>
+              <a:t>i</a:t>
+            </a:r>
+            <a:r>
+              <a:rPr lang="en-CN" sz="1200" dirty="0"/>
+              <a:t>nference buffer</a:t>
+            </a:r>
+          </a:p>
+        </p:txBody>
+      </p:sp>
+      <p:sp>
+        <p:nvSpPr>
+          <p:cNvPr id="40" name="Rounded Rectangle 39">
+            <a:extLst>
+              <a:ext uri="{FF2B5EF4-FFF2-40B4-BE49-F238E27FC236}">
+                <a16:creationId xmlns:a16="http://schemas.microsoft.com/office/drawing/2014/main" id="{4A369CBB-838F-2E3A-7C47-AF5BD195F970}"/>
+              </a:ext>
+            </a:extLst>
+          </p:cNvPr>
+          <p:cNvSpPr/>
+          <p:nvPr/>
+        </p:nvSpPr>
+        <p:spPr>
+          <a:xfrm>
+            <a:off x="5611511" y="2623860"/>
+            <a:ext cx="1079990" cy="680157"/>
+          </a:xfrm>
+          <a:prstGeom prst="roundRect">
+            <a:avLst/>
+          </a:prstGeom>
+          <a:solidFill>
+            <a:schemeClr val="accent2">
+              <a:lumMod val="75000"/>
+            </a:schemeClr>
+          </a:solidFill>
+        </p:spPr>
+        <p:style>
+          <a:lnRef idx="2">
+            <a:schemeClr val="accent1">
+              <a:shade val="15000"/>
+            </a:schemeClr>
+          </a:lnRef>
+          <a:fillRef idx="1">
+            <a:schemeClr val="accent1"/>
+          </a:fillRef>
+          <a:effectRef idx="0">
+            <a:schemeClr val="accent1"/>
+          </a:effectRef>
+          <a:fontRef idx="minor">
+            <a:schemeClr val="lt1"/>
+          </a:fontRef>
+        </p:style>
+        <p:txBody>
+          <a:bodyPr rtlCol="0" anchor="ctr"/>
+          <a:lstStyle/>
+          <a:p>
+            <a:pPr algn="ctr"/>
+            <a:r>
+              <a:rPr lang="en-US" sz="1200" dirty="0"/>
+              <a:t>o</a:t>
+            </a:r>
+            <a:r>
+              <a:rPr lang="en-CN" sz="1200" dirty="0"/>
+              <a:t>t buffer</a:t>
+            </a:r>
+          </a:p>
+        </p:txBody>
+      </p:sp>
+      <p:sp>
+        <p:nvSpPr>
+          <p:cNvPr id="41" name="TextBox 40">
+            <a:extLst>
+              <a:ext uri="{FF2B5EF4-FFF2-40B4-BE49-F238E27FC236}">
+                <a16:creationId xmlns:a16="http://schemas.microsoft.com/office/drawing/2014/main" id="{9BFE30BA-AD88-3F28-529C-F6702DFEC00B}"/>
+              </a:ext>
+            </a:extLst>
+          </p:cNvPr>
+          <p:cNvSpPr txBox="1"/>
+          <p:nvPr/>
+        </p:nvSpPr>
+        <p:spPr>
+          <a:xfrm>
+            <a:off x="803824" y="2405718"/>
+            <a:ext cx="694421" cy="276999"/>
+          </a:xfrm>
+          <a:prstGeom prst="rect">
+            <a:avLst/>
+          </a:prstGeom>
+          <a:noFill/>
+        </p:spPr>
+        <p:txBody>
+          <a:bodyPr wrap="none" rtlCol="0">
+            <a:spAutoFit/>
+          </a:bodyPr>
+          <a:lstStyle/>
+          <a:p>
+            <a:r>
+              <a:rPr lang="en-CN" sz="1200" dirty="0"/>
+              <a:t>L1 Mem</a:t>
+            </a:r>
+          </a:p>
+        </p:txBody>
+      </p:sp>
+      <p:cxnSp>
+        <p:nvCxnSpPr>
+          <p:cNvPr id="42" name="Straight Arrow Connector 41">
+            <a:extLst>
+              <a:ext uri="{FF2B5EF4-FFF2-40B4-BE49-F238E27FC236}">
+                <a16:creationId xmlns:a16="http://schemas.microsoft.com/office/drawing/2014/main" id="{9C6FBDB4-55F4-ABB5-FB82-6F9F7D37F544}"/>
+              </a:ext>
+            </a:extLst>
+          </p:cNvPr>
+          <p:cNvCxnSpPr>
+            <a:cxnSpLocks/>
+            <a:stCxn id="13" idx="0"/>
+          </p:cNvCxnSpPr>
+          <p:nvPr/>
+        </p:nvCxnSpPr>
+        <p:spPr>
+          <a:xfrm flipV="1">
+            <a:off x="1477265" y="3304017"/>
+            <a:ext cx="0" cy="623776"/>
+          </a:xfrm>
+          <a:prstGeom prst="straightConnector1">
+            <a:avLst/>
+          </a:prstGeom>
+          <a:ln w="25400">
+            <a:headEnd type="triangle"/>
+            <a:tailEnd type="triangle"/>
+          </a:ln>
+        </p:spPr>
+        <p:style>
+          <a:lnRef idx="1">
+            <a:schemeClr val="dk1"/>
+          </a:lnRef>
+          <a:fillRef idx="0">
+            <a:schemeClr val="dk1"/>
+          </a:fillRef>
+          <a:effectRef idx="0">
+            <a:schemeClr val="dk1"/>
+          </a:effectRef>
+          <a:fontRef idx="minor">
+            <a:schemeClr val="tx1"/>
+          </a:fontRef>
+        </p:style>
+      </p:cxnSp>
+      <p:cxnSp>
+        <p:nvCxnSpPr>
+          <p:cNvPr id="45" name="Straight Arrow Connector 44">
+            <a:extLst>
+              <a:ext uri="{FF2B5EF4-FFF2-40B4-BE49-F238E27FC236}">
+                <a16:creationId xmlns:a16="http://schemas.microsoft.com/office/drawing/2014/main" id="{CAC81A2C-95A2-94C4-C51C-D0B8C9FF1D61}"/>
+              </a:ext>
+            </a:extLst>
+          </p:cNvPr>
+          <p:cNvCxnSpPr>
+            <a:cxnSpLocks/>
+            <a:stCxn id="14" idx="0"/>
+          </p:cNvCxnSpPr>
+          <p:nvPr/>
+        </p:nvCxnSpPr>
+        <p:spPr>
+          <a:xfrm flipV="1">
+            <a:off x="2620127" y="3304017"/>
+            <a:ext cx="0" cy="623776"/>
+          </a:xfrm>
+          <a:prstGeom prst="straightConnector1">
+            <a:avLst/>
+          </a:prstGeom>
+          <a:ln w="25400">
+            <a:headEnd type="triangle"/>
+            <a:tailEnd type="triangle"/>
+          </a:ln>
+        </p:spPr>
+        <p:style>
+          <a:lnRef idx="1">
+            <a:schemeClr val="dk1"/>
+          </a:lnRef>
+          <a:fillRef idx="0">
+            <a:schemeClr val="dk1"/>
+          </a:fillRef>
+          <a:effectRef idx="0">
+            <a:schemeClr val="dk1"/>
+          </a:effectRef>
+          <a:fontRef idx="minor">
+            <a:schemeClr val="tx1"/>
+          </a:fontRef>
+        </p:style>
+      </p:cxnSp>
+      <p:cxnSp>
+        <p:nvCxnSpPr>
+          <p:cNvPr id="46" name="Straight Arrow Connector 45">
+            <a:extLst>
+              <a:ext uri="{FF2B5EF4-FFF2-40B4-BE49-F238E27FC236}">
+                <a16:creationId xmlns:a16="http://schemas.microsoft.com/office/drawing/2014/main" id="{8D786D00-0813-24CD-A6F0-00FB4B9D89E5}"/>
+              </a:ext>
+            </a:extLst>
+          </p:cNvPr>
+          <p:cNvCxnSpPr>
+            <a:cxnSpLocks/>
+          </p:cNvCxnSpPr>
+          <p:nvPr/>
+        </p:nvCxnSpPr>
+        <p:spPr>
+          <a:xfrm flipV="1">
+            <a:off x="3642724" y="3304017"/>
+            <a:ext cx="0" cy="617349"/>
+          </a:xfrm>
+          <a:prstGeom prst="straightConnector1">
+            <a:avLst/>
+          </a:prstGeom>
+          <a:ln w="25400">
+            <a:headEnd type="triangle"/>
+            <a:tailEnd type="triangle"/>
+          </a:ln>
+        </p:spPr>
+        <p:style>
+          <a:lnRef idx="1">
+            <a:schemeClr val="dk1"/>
+          </a:lnRef>
+          <a:fillRef idx="0">
+            <a:schemeClr val="dk1"/>
+          </a:fillRef>
+          <a:effectRef idx="0">
+            <a:schemeClr val="dk1"/>
+          </a:effectRef>
+          <a:fontRef idx="minor">
+            <a:schemeClr val="tx1"/>
+          </a:fontRef>
+        </p:style>
+      </p:cxnSp>
+      <p:cxnSp>
+        <p:nvCxnSpPr>
+          <p:cNvPr id="75" name="Straight Arrow Connector 74">
+            <a:extLst>
+              <a:ext uri="{FF2B5EF4-FFF2-40B4-BE49-F238E27FC236}">
+                <a16:creationId xmlns:a16="http://schemas.microsoft.com/office/drawing/2014/main" id="{4C289341-2C2B-B77A-CE9A-9E3FA67F8CDC}"/>
+              </a:ext>
+            </a:extLst>
+          </p:cNvPr>
+          <p:cNvCxnSpPr>
+            <a:cxnSpLocks/>
+            <a:stCxn id="18" idx="0"/>
+          </p:cNvCxnSpPr>
+          <p:nvPr/>
+        </p:nvCxnSpPr>
+        <p:spPr>
+          <a:xfrm flipH="1" flipV="1">
+            <a:off x="4963207" y="3304017"/>
+            <a:ext cx="3769" cy="623776"/>
+          </a:xfrm>
+          <a:prstGeom prst="straightConnector1">
+            <a:avLst/>
+          </a:prstGeom>
+          <a:ln w="25400">
+            <a:headEnd type="triangle"/>
+            <a:tailEnd type="triangle"/>
+          </a:ln>
+        </p:spPr>
+        <p:style>
+          <a:lnRef idx="1">
+            <a:schemeClr val="dk1"/>
+          </a:lnRef>
+          <a:fillRef idx="0">
+            <a:schemeClr val="dk1"/>
+          </a:fillRef>
+          <a:effectRef idx="0">
+            <a:schemeClr val="dk1"/>
+          </a:effectRef>
+          <a:fontRef idx="minor">
+            <a:schemeClr val="tx1"/>
+          </a:fontRef>
+        </p:style>
+      </p:cxnSp>
+      <p:cxnSp>
+        <p:nvCxnSpPr>
+          <p:cNvPr id="76" name="Straight Arrow Connector 75">
+            <a:extLst>
+              <a:ext uri="{FF2B5EF4-FFF2-40B4-BE49-F238E27FC236}">
+                <a16:creationId xmlns:a16="http://schemas.microsoft.com/office/drawing/2014/main" id="{EC257B1C-AA56-F7E9-78DA-87AEE9B30631}"/>
+              </a:ext>
+            </a:extLst>
+          </p:cNvPr>
+          <p:cNvCxnSpPr>
+            <a:cxnSpLocks/>
+          </p:cNvCxnSpPr>
+          <p:nvPr/>
+        </p:nvCxnSpPr>
+        <p:spPr>
+          <a:xfrm flipV="1">
+            <a:off x="5266338" y="3308191"/>
+            <a:ext cx="0" cy="1007644"/>
+          </a:xfrm>
+          <a:prstGeom prst="straightConnector1">
+            <a:avLst/>
+          </a:prstGeom>
+          <a:ln w="25400">
+            <a:headEnd type="triangle"/>
+            <a:tailEnd type="triangle"/>
+          </a:ln>
+        </p:spPr>
+        <p:style>
+          <a:lnRef idx="1">
+            <a:schemeClr val="dk1"/>
+          </a:lnRef>
+          <a:fillRef idx="0">
+            <a:schemeClr val="dk1"/>
+          </a:fillRef>
+          <a:effectRef idx="0">
+            <a:schemeClr val="dk1"/>
+          </a:effectRef>
+          <a:fontRef idx="minor">
+            <a:schemeClr val="tx1"/>
+          </a:fontRef>
+        </p:style>
+      </p:cxnSp>
+      <p:cxnSp>
+        <p:nvCxnSpPr>
+          <p:cNvPr id="78" name="Straight Arrow Connector 77">
+            <a:extLst>
+              <a:ext uri="{FF2B5EF4-FFF2-40B4-BE49-F238E27FC236}">
+                <a16:creationId xmlns:a16="http://schemas.microsoft.com/office/drawing/2014/main" id="{1CEAE506-F01D-D15F-B7C8-6F3AD594D06B}"/>
+              </a:ext>
+            </a:extLst>
+          </p:cNvPr>
+          <p:cNvCxnSpPr>
+            <a:cxnSpLocks/>
+            <a:stCxn id="19" idx="0"/>
+            <a:endCxn id="40" idx="2"/>
+          </p:cNvCxnSpPr>
+          <p:nvPr/>
+        </p:nvCxnSpPr>
+        <p:spPr>
+          <a:xfrm flipV="1">
+            <a:off x="6151506" y="3304017"/>
+            <a:ext cx="0" cy="623778"/>
+          </a:xfrm>
+          <a:prstGeom prst="straightConnector1">
+            <a:avLst/>
+          </a:prstGeom>
+          <a:ln w="25400">
+            <a:headEnd type="triangle"/>
+            <a:tailEnd type="triangle"/>
+          </a:ln>
+        </p:spPr>
+        <p:style>
+          <a:lnRef idx="1">
+            <a:schemeClr val="dk1"/>
+          </a:lnRef>
+          <a:fillRef idx="0">
+            <a:schemeClr val="dk1"/>
+          </a:fillRef>
+          <a:effectRef idx="0">
+            <a:schemeClr val="dk1"/>
+          </a:effectRef>
+          <a:fontRef idx="minor">
+            <a:schemeClr val="tx1"/>
+          </a:fontRef>
+        </p:style>
+      </p:cxnSp>
+      <p:cxnSp>
+        <p:nvCxnSpPr>
+          <p:cNvPr id="81" name="Elbow Connector 80">
+            <a:extLst>
+              <a:ext uri="{FF2B5EF4-FFF2-40B4-BE49-F238E27FC236}">
+                <a16:creationId xmlns:a16="http://schemas.microsoft.com/office/drawing/2014/main" id="{5330762C-7F8B-DA57-0732-CEADA52AC24A}"/>
+              </a:ext>
+            </a:extLst>
+          </p:cNvPr>
+          <p:cNvCxnSpPr>
+            <a:cxnSpLocks/>
+            <a:stCxn id="20" idx="3"/>
+            <a:endCxn id="40" idx="1"/>
+          </p:cNvCxnSpPr>
+          <p:nvPr/>
+        </p:nvCxnSpPr>
+        <p:spPr>
+          <a:xfrm flipV="1">
+            <a:off x="4253049" y="2963939"/>
+            <a:ext cx="1358462" cy="1363094"/>
+          </a:xfrm>
+          <a:prstGeom prst="bentConnector3">
+            <a:avLst>
+              <a:gd name="adj1" fmla="val 10497"/>
+            </a:avLst>
+          </a:prstGeom>
+          <a:ln w="25400">
+            <a:solidFill>
+              <a:schemeClr val="tx1"/>
+            </a:solidFill>
+            <a:tailEnd type="triangle"/>
+          </a:ln>
+        </p:spPr>
+        <p:style>
+          <a:lnRef idx="1">
+            <a:schemeClr val="accent1"/>
+          </a:lnRef>
+          <a:fillRef idx="0">
+            <a:schemeClr val="accent1"/>
+          </a:fillRef>
+          <a:effectRef idx="0">
+            <a:schemeClr val="accent1"/>
+          </a:effectRef>
+          <a:fontRef idx="minor">
+            <a:schemeClr val="tx1"/>
+          </a:fontRef>
+        </p:style>
+      </p:cxnSp>
+      <p:sp>
+        <p:nvSpPr>
+          <p:cNvPr id="89" name="Rectangle 88">
+            <a:extLst>
+              <a:ext uri="{FF2B5EF4-FFF2-40B4-BE49-F238E27FC236}">
+                <a16:creationId xmlns:a16="http://schemas.microsoft.com/office/drawing/2014/main" id="{3A633AFB-1A5D-D8AE-9070-0F6A457BEEDF}"/>
+              </a:ext>
+            </a:extLst>
+          </p:cNvPr>
+          <p:cNvSpPr/>
+          <p:nvPr/>
+        </p:nvSpPr>
+        <p:spPr>
+          <a:xfrm>
+            <a:off x="829491" y="1703911"/>
+            <a:ext cx="3768635" cy="485540"/>
+          </a:xfrm>
+          <a:prstGeom prst="rect">
+            <a:avLst/>
+          </a:prstGeom>
+        </p:spPr>
+        <p:style>
+          <a:lnRef idx="2">
+            <a:schemeClr val="dk1"/>
+          </a:lnRef>
+          <a:fillRef idx="1">
+            <a:schemeClr val="lt1"/>
+          </a:fillRef>
+          <a:effectRef idx="0">
+            <a:schemeClr val="dk1"/>
+          </a:effectRef>
+          <a:fontRef idx="minor">
+            <a:schemeClr val="dk1"/>
+          </a:fontRef>
+        </p:style>
+        <p:txBody>
+          <a:bodyPr rtlCol="0" anchor="ctr"/>
+          <a:lstStyle/>
+          <a:p>
+            <a:pPr algn="ctr"/>
+            <a:r>
+              <a:rPr lang="en-US" sz="1200" dirty="0"/>
+              <a:t>I</a:t>
+            </a:r>
+            <a:r>
+              <a:rPr lang="en-CN" sz="1200" dirty="0"/>
+              <a:t>nference engine</a:t>
+            </a:r>
+          </a:p>
+        </p:txBody>
+      </p:sp>
+      <p:sp>
+        <p:nvSpPr>
+          <p:cNvPr id="90" name="Rectangle 89">
+            <a:extLst>
+              <a:ext uri="{FF2B5EF4-FFF2-40B4-BE49-F238E27FC236}">
+                <a16:creationId xmlns:a16="http://schemas.microsoft.com/office/drawing/2014/main" id="{2F9BA1CC-FEFE-2543-79EC-6D2D9B260D1D}"/>
+              </a:ext>
+            </a:extLst>
+          </p:cNvPr>
+          <p:cNvSpPr/>
+          <p:nvPr/>
+        </p:nvSpPr>
+        <p:spPr>
+          <a:xfrm>
+            <a:off x="4733979" y="1706967"/>
+            <a:ext cx="2023924" cy="487443"/>
+          </a:xfrm>
+          <a:prstGeom prst="rect">
+            <a:avLst/>
+          </a:prstGeom>
+          <a:solidFill>
+            <a:schemeClr val="accent2"/>
+          </a:solidFill>
+        </p:spPr>
+        <p:style>
+          <a:lnRef idx="2">
+            <a:schemeClr val="accent1">
+              <a:shade val="15000"/>
+            </a:schemeClr>
+          </a:lnRef>
+          <a:fillRef idx="1">
+            <a:schemeClr val="accent1"/>
+          </a:fillRef>
+          <a:effectRef idx="0">
+            <a:schemeClr val="accent1"/>
+          </a:effectRef>
+          <a:fontRef idx="minor">
+            <a:schemeClr val="lt1"/>
+          </a:fontRef>
+        </p:style>
+        <p:txBody>
+          <a:bodyPr rtlCol="0" anchor="ctr"/>
+          <a:lstStyle/>
+          <a:p>
+            <a:pPr algn="ctr"/>
+            <a:r>
+              <a:rPr lang="en-US" sz="1200" dirty="0"/>
+              <a:t>Online training engine</a:t>
+            </a:r>
+            <a:endParaRPr lang="en-CN" sz="1200" dirty="0"/>
+          </a:p>
+        </p:txBody>
+      </p:sp>
+      <p:cxnSp>
+        <p:nvCxnSpPr>
+          <p:cNvPr id="91" name="Straight Arrow Connector 90">
+            <a:extLst>
+              <a:ext uri="{FF2B5EF4-FFF2-40B4-BE49-F238E27FC236}">
+                <a16:creationId xmlns:a16="http://schemas.microsoft.com/office/drawing/2014/main" id="{80128C80-D0B7-8323-B6D0-B6063ECCEF12}"/>
+              </a:ext>
+            </a:extLst>
+          </p:cNvPr>
+          <p:cNvCxnSpPr>
+            <a:cxnSpLocks/>
+          </p:cNvCxnSpPr>
+          <p:nvPr/>
+        </p:nvCxnSpPr>
+        <p:spPr>
+          <a:xfrm flipV="1">
+            <a:off x="5266338" y="2189451"/>
+            <a:ext cx="0" cy="442634"/>
+          </a:xfrm>
+          <a:prstGeom prst="straightConnector1">
+            <a:avLst/>
+          </a:prstGeom>
+          <a:ln w="25400">
+            <a:headEnd type="triangle"/>
+            <a:tailEnd type="triangle"/>
+          </a:ln>
+        </p:spPr>
+        <p:style>
+          <a:lnRef idx="1">
+            <a:schemeClr val="dk1"/>
+          </a:lnRef>
+          <a:fillRef idx="0">
+            <a:schemeClr val="dk1"/>
+          </a:fillRef>
+          <a:effectRef idx="0">
+            <a:schemeClr val="dk1"/>
+          </a:effectRef>
+          <a:fontRef idx="minor">
+            <a:schemeClr val="tx1"/>
+          </a:fontRef>
+        </p:style>
+      </p:cxnSp>
+      <p:cxnSp>
+        <p:nvCxnSpPr>
+          <p:cNvPr id="93" name="Straight Arrow Connector 92">
+            <a:extLst>
+              <a:ext uri="{FF2B5EF4-FFF2-40B4-BE49-F238E27FC236}">
+                <a16:creationId xmlns:a16="http://schemas.microsoft.com/office/drawing/2014/main" id="{2DB2B9D5-51D1-95CB-E0FB-0564534DAB97}"/>
+              </a:ext>
+            </a:extLst>
+          </p:cNvPr>
+          <p:cNvCxnSpPr>
+            <a:cxnSpLocks/>
+          </p:cNvCxnSpPr>
+          <p:nvPr/>
+        </p:nvCxnSpPr>
+        <p:spPr>
+          <a:xfrm flipV="1">
+            <a:off x="6151506" y="2189451"/>
+            <a:ext cx="0" cy="434409"/>
+          </a:xfrm>
+          <a:prstGeom prst="straightConnector1">
+            <a:avLst/>
+          </a:prstGeom>
+          <a:ln w="25400">
+            <a:headEnd type="triangle"/>
+            <a:tailEnd type="triangle"/>
+          </a:ln>
+        </p:spPr>
+        <p:style>
+          <a:lnRef idx="1">
+            <a:schemeClr val="dk1"/>
+          </a:lnRef>
+          <a:fillRef idx="0">
+            <a:schemeClr val="dk1"/>
+          </a:fillRef>
+          <a:effectRef idx="0">
+            <a:schemeClr val="dk1"/>
+          </a:effectRef>
+          <a:fontRef idx="minor">
+            <a:schemeClr val="tx1"/>
+          </a:fontRef>
+        </p:style>
+      </p:cxnSp>
+      <p:cxnSp>
+        <p:nvCxnSpPr>
+          <p:cNvPr id="95" name="Straight Arrow Connector 94">
+            <a:extLst>
+              <a:ext uri="{FF2B5EF4-FFF2-40B4-BE49-F238E27FC236}">
+                <a16:creationId xmlns:a16="http://schemas.microsoft.com/office/drawing/2014/main" id="{C1179691-B7C9-DDC7-828C-7B4A6AB90038}"/>
+              </a:ext>
+            </a:extLst>
+          </p:cNvPr>
+          <p:cNvCxnSpPr>
+            <a:cxnSpLocks/>
+          </p:cNvCxnSpPr>
+          <p:nvPr/>
+        </p:nvCxnSpPr>
+        <p:spPr>
+          <a:xfrm flipV="1">
+            <a:off x="2751366" y="2184401"/>
+            <a:ext cx="0" cy="442634"/>
+          </a:xfrm>
+          <a:prstGeom prst="straightConnector1">
+            <a:avLst/>
+          </a:prstGeom>
+          <a:ln w="25400">
+            <a:headEnd type="triangle"/>
+            <a:tailEnd type="triangle"/>
+          </a:ln>
+        </p:spPr>
+        <p:style>
+          <a:lnRef idx="1">
+            <a:schemeClr val="dk1"/>
+          </a:lnRef>
+          <a:fillRef idx="0">
+            <a:schemeClr val="dk1"/>
+          </a:fillRef>
+          <a:effectRef idx="0">
+            <a:schemeClr val="dk1"/>
+          </a:effectRef>
+          <a:fontRef idx="minor">
+            <a:schemeClr val="tx1"/>
+          </a:fontRef>
+        </p:style>
+      </p:cxnSp>
+      <p:sp>
+        <p:nvSpPr>
+          <p:cNvPr id="97" name="Rounded Rectangle 96">
+            <a:extLst>
+              <a:ext uri="{FF2B5EF4-FFF2-40B4-BE49-F238E27FC236}">
+                <a16:creationId xmlns:a16="http://schemas.microsoft.com/office/drawing/2014/main" id="{172134D8-E855-75D2-9A81-CFA8848103CC}"/>
+              </a:ext>
+            </a:extLst>
+          </p:cNvPr>
+          <p:cNvSpPr/>
+          <p:nvPr/>
+        </p:nvSpPr>
+        <p:spPr>
+          <a:xfrm>
+            <a:off x="829491" y="3504594"/>
+            <a:ext cx="5928411" cy="138499"/>
+          </a:xfrm>
+          <a:prstGeom prst="roundRect">
+            <a:avLst/>
+          </a:prstGeom>
+          <a:solidFill>
+            <a:schemeClr val="bg2">
+              <a:lumMod val="75000"/>
+            </a:schemeClr>
+          </a:solidFill>
+          <a:ln>
+            <a:noFill/>
+          </a:ln>
+        </p:spPr>
+        <p:style>
+          <a:lnRef idx="2">
+            <a:schemeClr val="accent1">
+              <a:shade val="15000"/>
+            </a:schemeClr>
+          </a:lnRef>
+          <a:fillRef idx="1">
+            <a:schemeClr val="accent1"/>
+          </a:fillRef>
+          <a:effectRef idx="0">
+            <a:schemeClr val="accent1"/>
+          </a:effectRef>
+          <a:fontRef idx="minor">
+            <a:schemeClr val="lt1"/>
+          </a:fontRef>
+        </p:style>
+        <p:txBody>
+          <a:bodyPr rtlCol="0" anchor="ctr"/>
+          <a:lstStyle/>
+          <a:p>
+            <a:pPr algn="ctr"/>
+            <a:r>
+              <a:rPr lang="en-CN" sz="1000" dirty="0"/>
+              <a:t>DMA</a:t>
+            </a:r>
+          </a:p>
+        </p:txBody>
+      </p:sp>
+      <p:sp>
+        <p:nvSpPr>
+          <p:cNvPr id="33" name="TextBox 32">
+            <a:extLst>
+              <a:ext uri="{FF2B5EF4-FFF2-40B4-BE49-F238E27FC236}">
+                <a16:creationId xmlns:a16="http://schemas.microsoft.com/office/drawing/2014/main" id="{C127B0A0-3ECC-3A13-0BDE-B5B97A7A508D}"/>
+              </a:ext>
+            </a:extLst>
+          </p:cNvPr>
+          <p:cNvSpPr txBox="1"/>
+          <p:nvPr/>
+        </p:nvSpPr>
+        <p:spPr>
+          <a:xfrm>
+            <a:off x="803824" y="3713608"/>
+            <a:ext cx="694421" cy="276999"/>
+          </a:xfrm>
+          <a:prstGeom prst="rect">
+            <a:avLst/>
+          </a:prstGeom>
+          <a:noFill/>
+        </p:spPr>
+        <p:txBody>
+          <a:bodyPr wrap="none" rtlCol="0">
+            <a:spAutoFit/>
+          </a:bodyPr>
+          <a:lstStyle/>
+          <a:p>
+            <a:r>
+              <a:rPr lang="en-CN" sz="1200" dirty="0"/>
+              <a:t>L2 Mem</a:t>
+            </a:r>
+          </a:p>
+        </p:txBody>
+      </p:sp>
+    </p:spTree>
+    <p:extLst>
+      <p:ext uri="{BB962C8B-B14F-4D97-AF65-F5344CB8AC3E}">
+        <p14:creationId xmlns:p14="http://schemas.microsoft.com/office/powerpoint/2010/main" val="1879506457"/>
+      </p:ext>
+    </p:extLst>
+  </p:cSld>
+  <p:clrMapOvr>
+    <a:masterClrMapping/>
+  </p:clrMapOvr>
+</p:sld>
+</file>
+
 <file path=ppt/theme/theme1.xml><?xml version="1.0" encoding="utf-8"?>
 <a:theme xmlns:a="http://schemas.openxmlformats.org/drawingml/2006/main" name="Office Theme">
   <a:themeElements>

</xml_diff>

<commit_message>
qvar & gym gap9 projects
</commit_message>
<xml_diff>
--- a/figures/fig.pptx
+++ b/figures/fig.pptx
@@ -9,6 +9,8 @@
     <p:sldId id="257" r:id="rId3"/>
     <p:sldId id="258" r:id="rId4"/>
     <p:sldId id="259" r:id="rId5"/>
+    <p:sldId id="260" r:id="rId6"/>
+    <p:sldId id="261" r:id="rId7"/>
   </p:sldIdLst>
   <p:sldSz cx="12192000" cy="6858000"/>
   <p:notesSz cx="6858000" cy="9144000"/>
@@ -264,7 +266,7 @@
           <a:p>
             <a:fld id="{F2AAFE3D-A000-4E48-8FB2-BCF858431792}" type="datetimeFigureOut">
               <a:rPr lang="en-CN" smtClean="0"/>
-              <a:t>2023/9/5</a:t>
+              <a:t>2023/9/6</a:t>
             </a:fld>
             <a:endParaRPr lang="en-CN"/>
           </a:p>
@@ -464,7 +466,7 @@
           <a:p>
             <a:fld id="{F2AAFE3D-A000-4E48-8FB2-BCF858431792}" type="datetimeFigureOut">
               <a:rPr lang="en-CN" smtClean="0"/>
-              <a:t>2023/9/5</a:t>
+              <a:t>2023/9/6</a:t>
             </a:fld>
             <a:endParaRPr lang="en-CN"/>
           </a:p>
@@ -674,7 +676,7 @@
           <a:p>
             <a:fld id="{F2AAFE3D-A000-4E48-8FB2-BCF858431792}" type="datetimeFigureOut">
               <a:rPr lang="en-CN" smtClean="0"/>
-              <a:t>2023/9/5</a:t>
+              <a:t>2023/9/6</a:t>
             </a:fld>
             <a:endParaRPr lang="en-CN"/>
           </a:p>
@@ -874,7 +876,7 @@
           <a:p>
             <a:fld id="{F2AAFE3D-A000-4E48-8FB2-BCF858431792}" type="datetimeFigureOut">
               <a:rPr lang="en-CN" smtClean="0"/>
-              <a:t>2023/9/5</a:t>
+              <a:t>2023/9/6</a:t>
             </a:fld>
             <a:endParaRPr lang="en-CN"/>
           </a:p>
@@ -1150,7 +1152,7 @@
           <a:p>
             <a:fld id="{F2AAFE3D-A000-4E48-8FB2-BCF858431792}" type="datetimeFigureOut">
               <a:rPr lang="en-CN" smtClean="0"/>
-              <a:t>2023/9/5</a:t>
+              <a:t>2023/9/6</a:t>
             </a:fld>
             <a:endParaRPr lang="en-CN"/>
           </a:p>
@@ -1418,7 +1420,7 @@
           <a:p>
             <a:fld id="{F2AAFE3D-A000-4E48-8FB2-BCF858431792}" type="datetimeFigureOut">
               <a:rPr lang="en-CN" smtClean="0"/>
-              <a:t>2023/9/5</a:t>
+              <a:t>2023/9/6</a:t>
             </a:fld>
             <a:endParaRPr lang="en-CN"/>
           </a:p>
@@ -1833,7 +1835,7 @@
           <a:p>
             <a:fld id="{F2AAFE3D-A000-4E48-8FB2-BCF858431792}" type="datetimeFigureOut">
               <a:rPr lang="en-CN" smtClean="0"/>
-              <a:t>2023/9/5</a:t>
+              <a:t>2023/9/6</a:t>
             </a:fld>
             <a:endParaRPr lang="en-CN"/>
           </a:p>
@@ -1975,7 +1977,7 @@
           <a:p>
             <a:fld id="{F2AAFE3D-A000-4E48-8FB2-BCF858431792}" type="datetimeFigureOut">
               <a:rPr lang="en-CN" smtClean="0"/>
-              <a:t>2023/9/5</a:t>
+              <a:t>2023/9/6</a:t>
             </a:fld>
             <a:endParaRPr lang="en-CN"/>
           </a:p>
@@ -2088,7 +2090,7 @@
           <a:p>
             <a:fld id="{F2AAFE3D-A000-4E48-8FB2-BCF858431792}" type="datetimeFigureOut">
               <a:rPr lang="en-CN" smtClean="0"/>
-              <a:t>2023/9/5</a:t>
+              <a:t>2023/9/6</a:t>
             </a:fld>
             <a:endParaRPr lang="en-CN"/>
           </a:p>
@@ -2401,7 +2403,7 @@
           <a:p>
             <a:fld id="{F2AAFE3D-A000-4E48-8FB2-BCF858431792}" type="datetimeFigureOut">
               <a:rPr lang="en-CN" smtClean="0"/>
-              <a:t>2023/9/5</a:t>
+              <a:t>2023/9/6</a:t>
             </a:fld>
             <a:endParaRPr lang="en-CN"/>
           </a:p>
@@ -2690,7 +2692,7 @@
           <a:p>
             <a:fld id="{F2AAFE3D-A000-4E48-8FB2-BCF858431792}" type="datetimeFigureOut">
               <a:rPr lang="en-CN" smtClean="0"/>
-              <a:t>2023/9/5</a:t>
+              <a:t>2023/9/6</a:t>
             </a:fld>
             <a:endParaRPr lang="en-CN"/>
           </a:p>
@@ -2933,7 +2935,7 @@
           <a:p>
             <a:fld id="{F2AAFE3D-A000-4E48-8FB2-BCF858431792}" type="datetimeFigureOut">
               <a:rPr lang="en-CN" smtClean="0"/>
-              <a:t>2023/9/5</a:t>
+              <a:t>2023/9/6</a:t>
             </a:fld>
             <a:endParaRPr lang="en-CN"/>
           </a:p>
@@ -10612,6 +10614,96 @@
 </p:sld>
 </file>
 
+<file path=ppt/slides/slide5.xml><?xml version="1.0" encoding="utf-8"?>
+<p:sld xmlns:a="http://schemas.openxmlformats.org/drawingml/2006/main" xmlns:r="http://schemas.openxmlformats.org/officeDocument/2006/relationships" xmlns:p="http://schemas.openxmlformats.org/presentationml/2006/main">
+  <p:cSld>
+    <p:spTree>
+      <p:nvGrpSpPr>
+        <p:cNvPr id="1" name=""/>
+        <p:cNvGrpSpPr/>
+        <p:nvPr/>
+      </p:nvGrpSpPr>
+      <p:grpSpPr>
+        <a:xfrm>
+          <a:off x="0" y="0"/>
+          <a:ext cx="0" cy="0"/>
+          <a:chOff x="0" y="0"/>
+          <a:chExt cx="0" cy="0"/>
+        </a:xfrm>
+      </p:grpSpPr>
+      <p:pic>
+        <p:nvPicPr>
+          <p:cNvPr id="4" name="Picture 3">
+            <a:extLst>
+              <a:ext uri="{FF2B5EF4-FFF2-40B4-BE49-F238E27FC236}">
+                <a16:creationId xmlns:a16="http://schemas.microsoft.com/office/drawing/2014/main" id="{B2C6B9B0-B51C-1764-7F81-86592E7A36E4}"/>
+              </a:ext>
+            </a:extLst>
+          </p:cNvPr>
+          <p:cNvPicPr>
+            <a:picLocks noChangeAspect="1"/>
+          </p:cNvPicPr>
+          <p:nvPr/>
+        </p:nvPicPr>
+        <p:blipFill>
+          <a:blip r:embed="rId2"/>
+          <a:stretch>
+            <a:fillRect/>
+          </a:stretch>
+        </p:blipFill>
+        <p:spPr>
+          <a:xfrm>
+            <a:off x="1690255" y="862444"/>
+            <a:ext cx="7772400" cy="4692073"/>
+          </a:xfrm>
+          <a:prstGeom prst="rect">
+            <a:avLst/>
+          </a:prstGeom>
+        </p:spPr>
+      </p:pic>
+    </p:spTree>
+    <p:extLst>
+      <p:ext uri="{BB962C8B-B14F-4D97-AF65-F5344CB8AC3E}">
+        <p14:creationId xmlns:p14="http://schemas.microsoft.com/office/powerpoint/2010/main" val="1450579715"/>
+      </p:ext>
+    </p:extLst>
+  </p:cSld>
+  <p:clrMapOvr>
+    <a:masterClrMapping/>
+  </p:clrMapOvr>
+</p:sld>
+</file>
+
+<file path=ppt/slides/slide6.xml><?xml version="1.0" encoding="utf-8"?>
+<p:sld xmlns:a="http://schemas.openxmlformats.org/drawingml/2006/main" xmlns:r="http://schemas.openxmlformats.org/officeDocument/2006/relationships" xmlns:p="http://schemas.openxmlformats.org/presentationml/2006/main">
+  <p:cSld>
+    <p:spTree>
+      <p:nvGrpSpPr>
+        <p:cNvPr id="1" name=""/>
+        <p:cNvGrpSpPr/>
+        <p:nvPr/>
+      </p:nvGrpSpPr>
+      <p:grpSpPr>
+        <a:xfrm>
+          <a:off x="0" y="0"/>
+          <a:ext cx="0" cy="0"/>
+          <a:chOff x="0" y="0"/>
+          <a:chExt cx="0" cy="0"/>
+        </a:xfrm>
+      </p:grpSpPr>
+    </p:spTree>
+    <p:extLst>
+      <p:ext uri="{BB962C8B-B14F-4D97-AF65-F5344CB8AC3E}">
+        <p14:creationId xmlns:p14="http://schemas.microsoft.com/office/powerpoint/2010/main" val="2325877750"/>
+      </p:ext>
+    </p:extLst>
+  </p:cSld>
+  <p:clrMapOvr>
+    <a:masterClrMapping/>
+  </p:clrMapOvr>
+</p:sld>
+</file>
+
 <file path=ppt/theme/theme1.xml><?xml version="1.0" encoding="utf-8"?>
 <a:theme xmlns:a="http://schemas.openxmlformats.org/drawingml/2006/main" name="Office Theme">
   <a:themeElements>

</xml_diff>

<commit_message>
new ol engines & c32 model
</commit_message>
<xml_diff>
--- a/figures/fig.pptx
+++ b/figures/fig.pptx
@@ -266,7 +266,7 @@
           <a:p>
             <a:fld id="{F2AAFE3D-A000-4E48-8FB2-BCF858431792}" type="datetimeFigureOut">
               <a:rPr lang="en-CN" smtClean="0"/>
-              <a:t>2023/9/6</a:t>
+              <a:t>2023/9/19</a:t>
             </a:fld>
             <a:endParaRPr lang="en-CN"/>
           </a:p>
@@ -466,7 +466,7 @@
           <a:p>
             <a:fld id="{F2AAFE3D-A000-4E48-8FB2-BCF858431792}" type="datetimeFigureOut">
               <a:rPr lang="en-CN" smtClean="0"/>
-              <a:t>2023/9/6</a:t>
+              <a:t>2023/9/19</a:t>
             </a:fld>
             <a:endParaRPr lang="en-CN"/>
           </a:p>
@@ -676,7 +676,7 @@
           <a:p>
             <a:fld id="{F2AAFE3D-A000-4E48-8FB2-BCF858431792}" type="datetimeFigureOut">
               <a:rPr lang="en-CN" smtClean="0"/>
-              <a:t>2023/9/6</a:t>
+              <a:t>2023/9/19</a:t>
             </a:fld>
             <a:endParaRPr lang="en-CN"/>
           </a:p>
@@ -876,7 +876,7 @@
           <a:p>
             <a:fld id="{F2AAFE3D-A000-4E48-8FB2-BCF858431792}" type="datetimeFigureOut">
               <a:rPr lang="en-CN" smtClean="0"/>
-              <a:t>2023/9/6</a:t>
+              <a:t>2023/9/19</a:t>
             </a:fld>
             <a:endParaRPr lang="en-CN"/>
           </a:p>
@@ -1152,7 +1152,7 @@
           <a:p>
             <a:fld id="{F2AAFE3D-A000-4E48-8FB2-BCF858431792}" type="datetimeFigureOut">
               <a:rPr lang="en-CN" smtClean="0"/>
-              <a:t>2023/9/6</a:t>
+              <a:t>2023/9/19</a:t>
             </a:fld>
             <a:endParaRPr lang="en-CN"/>
           </a:p>
@@ -1420,7 +1420,7 @@
           <a:p>
             <a:fld id="{F2AAFE3D-A000-4E48-8FB2-BCF858431792}" type="datetimeFigureOut">
               <a:rPr lang="en-CN" smtClean="0"/>
-              <a:t>2023/9/6</a:t>
+              <a:t>2023/9/19</a:t>
             </a:fld>
             <a:endParaRPr lang="en-CN"/>
           </a:p>
@@ -1835,7 +1835,7 @@
           <a:p>
             <a:fld id="{F2AAFE3D-A000-4E48-8FB2-BCF858431792}" type="datetimeFigureOut">
               <a:rPr lang="en-CN" smtClean="0"/>
-              <a:t>2023/9/6</a:t>
+              <a:t>2023/9/19</a:t>
             </a:fld>
             <a:endParaRPr lang="en-CN"/>
           </a:p>
@@ -1977,7 +1977,7 @@
           <a:p>
             <a:fld id="{F2AAFE3D-A000-4E48-8FB2-BCF858431792}" type="datetimeFigureOut">
               <a:rPr lang="en-CN" smtClean="0"/>
-              <a:t>2023/9/6</a:t>
+              <a:t>2023/9/19</a:t>
             </a:fld>
             <a:endParaRPr lang="en-CN"/>
           </a:p>
@@ -2090,7 +2090,7 @@
           <a:p>
             <a:fld id="{F2AAFE3D-A000-4E48-8FB2-BCF858431792}" type="datetimeFigureOut">
               <a:rPr lang="en-CN" smtClean="0"/>
-              <a:t>2023/9/6</a:t>
+              <a:t>2023/9/19</a:t>
             </a:fld>
             <a:endParaRPr lang="en-CN"/>
           </a:p>
@@ -2403,7 +2403,7 @@
           <a:p>
             <a:fld id="{F2AAFE3D-A000-4E48-8FB2-BCF858431792}" type="datetimeFigureOut">
               <a:rPr lang="en-CN" smtClean="0"/>
-              <a:t>2023/9/6</a:t>
+              <a:t>2023/9/19</a:t>
             </a:fld>
             <a:endParaRPr lang="en-CN"/>
           </a:p>
@@ -2692,7 +2692,7 @@
           <a:p>
             <a:fld id="{F2AAFE3D-A000-4E48-8FB2-BCF858431792}" type="datetimeFigureOut">
               <a:rPr lang="en-CN" smtClean="0"/>
-              <a:t>2023/9/6</a:t>
+              <a:t>2023/9/19</a:t>
             </a:fld>
             <a:endParaRPr lang="en-CN"/>
           </a:p>
@@ -2935,7 +2935,7 @@
           <a:p>
             <a:fld id="{F2AAFE3D-A000-4E48-8FB2-BCF858431792}" type="datetimeFigureOut">
               <a:rPr lang="en-CN" smtClean="0"/>
-              <a:t>2023/9/6</a:t>
+              <a:t>2023/9/19</a:t>
             </a:fld>
             <a:endParaRPr lang="en-CN"/>
           </a:p>
@@ -9460,8 +9460,8 @@
         </p:nvSpPr>
         <p:spPr>
           <a:xfrm>
-            <a:off x="829491" y="2449794"/>
-            <a:ext cx="5928412" cy="952923"/>
+            <a:off x="829491" y="2711335"/>
+            <a:ext cx="5928412" cy="691382"/>
           </a:xfrm>
           <a:prstGeom prst="rect">
             <a:avLst/>
@@ -9567,8 +9567,8 @@
         </p:nvSpPr>
         <p:spPr>
           <a:xfrm>
-            <a:off x="4452483" y="3927793"/>
-            <a:ext cx="1028985" cy="303742"/>
+            <a:off x="4862424" y="3927793"/>
+            <a:ext cx="619043" cy="303742"/>
           </a:xfrm>
           <a:prstGeom prst="rect">
             <a:avLst/>
@@ -9836,8 +9836,8 @@
         </p:nvSpPr>
         <p:spPr>
           <a:xfrm>
-            <a:off x="891982" y="2629908"/>
-            <a:ext cx="4589482" cy="680157"/>
+            <a:off x="891982" y="2912230"/>
+            <a:ext cx="4589482" cy="397835"/>
           </a:xfrm>
           <a:prstGeom prst="roundRect">
             <a:avLst/>
@@ -9895,8 +9895,8 @@
         </p:nvSpPr>
         <p:spPr>
           <a:xfrm>
-            <a:off x="5611511" y="2623860"/>
-            <a:ext cx="1079990" cy="680157"/>
+            <a:off x="5611511" y="2906182"/>
+            <a:ext cx="1079990" cy="397835"/>
           </a:xfrm>
           <a:prstGeom prst="roundRect">
             <a:avLst/>
@@ -9953,7 +9953,7 @@
         </p:nvSpPr>
         <p:spPr>
           <a:xfrm>
-            <a:off x="803824" y="2405718"/>
+            <a:off x="803823" y="2679693"/>
             <a:ext cx="694421" cy="276999"/>
           </a:xfrm>
           <a:prstGeom prst="rect">
@@ -10113,56 +10113,13 @@
           </p:cNvPr>
           <p:cNvCxnSpPr>
             <a:cxnSpLocks/>
-            <a:stCxn id="18" idx="0"/>
           </p:cNvCxnSpPr>
           <p:nvPr/>
         </p:nvCxnSpPr>
         <p:spPr>
           <a:xfrm flipH="1" flipV="1">
-            <a:off x="4963207" y="3304017"/>
-            <a:ext cx="3769" cy="623776"/>
-          </a:xfrm>
-          <a:prstGeom prst="straightConnector1">
-            <a:avLst/>
-          </a:prstGeom>
-          <a:ln w="25400">
-            <a:headEnd type="triangle"/>
-            <a:tailEnd type="triangle"/>
-          </a:ln>
-        </p:spPr>
-        <p:style>
-          <a:lnRef idx="1">
-            <a:schemeClr val="dk1"/>
-          </a:lnRef>
-          <a:fillRef idx="0">
-            <a:schemeClr val="dk1"/>
-          </a:fillRef>
-          <a:effectRef idx="0">
-            <a:schemeClr val="dk1"/>
-          </a:effectRef>
-          <a:fontRef idx="minor">
-            <a:schemeClr val="tx1"/>
-          </a:fontRef>
-        </p:style>
-      </p:cxnSp>
-      <p:cxnSp>
-        <p:nvCxnSpPr>
-          <p:cNvPr id="76" name="Straight Arrow Connector 75">
-            <a:extLst>
-              <a:ext uri="{FF2B5EF4-FFF2-40B4-BE49-F238E27FC236}">
-                <a16:creationId xmlns:a16="http://schemas.microsoft.com/office/drawing/2014/main" id="{EC257B1C-AA56-F7E9-78DA-87AEE9B30631}"/>
-              </a:ext>
-            </a:extLst>
-          </p:cNvPr>
-          <p:cNvCxnSpPr>
-            <a:cxnSpLocks/>
-          </p:cNvCxnSpPr>
-          <p:nvPr/>
-        </p:nvCxnSpPr>
-        <p:spPr>
-          <a:xfrm flipV="1">
-            <a:off x="5266338" y="3308191"/>
-            <a:ext cx="0" cy="1007644"/>
+            <a:off x="4662995" y="3309616"/>
+            <a:ext cx="3764" cy="1011818"/>
           </a:xfrm>
           <a:prstGeom prst="straightConnector1">
             <a:avLst/>
@@ -10243,19 +10200,16 @@
           <p:cNvCxnSpPr>
             <a:cxnSpLocks/>
             <a:stCxn id="20" idx="3"/>
-            <a:endCxn id="40" idx="1"/>
           </p:cNvCxnSpPr>
           <p:nvPr/>
         </p:nvCxnSpPr>
         <p:spPr>
           <a:xfrm flipV="1">
-            <a:off x="4253049" y="2963939"/>
-            <a:ext cx="1358462" cy="1363094"/>
+            <a:off x="4253049" y="3304017"/>
+            <a:ext cx="137282" cy="1023016"/>
           </a:xfrm>
-          <a:prstGeom prst="bentConnector3">
-            <a:avLst>
-              <a:gd name="adj1" fmla="val 10497"/>
-            </a:avLst>
+          <a:prstGeom prst="bentConnector2">
+            <a:avLst/>
           </a:prstGeom>
           <a:ln w="25400">
             <a:solidFill>
@@ -10293,7 +10247,7 @@
         </p:nvSpPr>
         <p:spPr>
           <a:xfrm>
-            <a:off x="829491" y="1703911"/>
+            <a:off x="829491" y="1994196"/>
             <a:ext cx="3768635" cy="485540"/>
           </a:xfrm>
           <a:prstGeom prst="rect">
@@ -10344,7 +10298,7 @@
         </p:nvSpPr>
         <p:spPr>
           <a:xfrm>
-            <a:off x="4733979" y="1706967"/>
+            <a:off x="4733979" y="1997252"/>
             <a:ext cx="2023924" cy="487443"/>
           </a:xfrm>
           <a:prstGeom prst="rect">
@@ -10399,7 +10353,7 @@
         </p:nvCxnSpPr>
         <p:spPr>
           <a:xfrm flipV="1">
-            <a:off x="5266338" y="2189451"/>
+            <a:off x="5266338" y="2479736"/>
             <a:ext cx="0" cy="442634"/>
           </a:xfrm>
           <a:prstGeom prst="straightConnector1">
@@ -10441,7 +10395,7 @@
         </p:nvCxnSpPr>
         <p:spPr>
           <a:xfrm flipV="1">
-            <a:off x="6151506" y="2189451"/>
+            <a:off x="6151506" y="2479736"/>
             <a:ext cx="0" cy="434409"/>
           </a:xfrm>
           <a:prstGeom prst="straightConnector1">
@@ -10483,7 +10437,7 @@
         </p:nvCxnSpPr>
         <p:spPr>
           <a:xfrm flipV="1">
-            <a:off x="2751366" y="2184401"/>
+            <a:off x="2751366" y="2474686"/>
             <a:ext cx="0" cy="442634"/>
           </a:xfrm>
           <a:prstGeom prst="straightConnector1">
@@ -10601,6 +10555,52 @@
           </a:p>
         </p:txBody>
       </p:sp>
+      <p:cxnSp>
+        <p:nvCxnSpPr>
+          <p:cNvPr id="6" name="Elbow Connector 5">
+            <a:extLst>
+              <a:ext uri="{FF2B5EF4-FFF2-40B4-BE49-F238E27FC236}">
+                <a16:creationId xmlns:a16="http://schemas.microsoft.com/office/drawing/2014/main" id="{3C20F839-ADFF-A6A7-8308-C4C43C818010}"/>
+              </a:ext>
+            </a:extLst>
+          </p:cNvPr>
+          <p:cNvCxnSpPr>
+            <a:cxnSpLocks/>
+            <a:stCxn id="18" idx="0"/>
+            <a:endCxn id="40" idx="1"/>
+          </p:cNvCxnSpPr>
+          <p:nvPr/>
+        </p:nvCxnSpPr>
+        <p:spPr>
+          <a:xfrm rot="5400000" flipH="1" flipV="1">
+            <a:off x="4980382" y="3296665"/>
+            <a:ext cx="822693" cy="439565"/>
+          </a:xfrm>
+          <a:prstGeom prst="bentConnector2">
+            <a:avLst/>
+          </a:prstGeom>
+          <a:ln w="25400">
+            <a:solidFill>
+              <a:schemeClr val="tx1"/>
+            </a:solidFill>
+            <a:tailEnd type="triangle"/>
+          </a:ln>
+        </p:spPr>
+        <p:style>
+          <a:lnRef idx="1">
+            <a:schemeClr val="accent1"/>
+          </a:lnRef>
+          <a:fillRef idx="0">
+            <a:schemeClr val="accent1"/>
+          </a:fillRef>
+          <a:effectRef idx="0">
+            <a:schemeClr val="accent1"/>
+          </a:effectRef>
+          <a:fontRef idx="minor">
+            <a:schemeClr val="tx1"/>
+          </a:fontRef>
+        </p:style>
+      </p:cxnSp>
     </p:spTree>
     <p:extLst>
       <p:ext uri="{BB962C8B-B14F-4D97-AF65-F5344CB8AC3E}">

</xml_diff>